<commit_message>
added more stuff, need to add reference and video
</commit_message>
<xml_diff>
--- a/Cloth Presentation; not finished.pptx
+++ b/Cloth Presentation; not finished.pptx
@@ -9,14 +9,16 @@
     <p:sldId id="257" r:id="rId3"/>
     <p:sldId id="258" r:id="rId4"/>
     <p:sldId id="259" r:id="rId5"/>
-    <p:sldId id="260" r:id="rId6"/>
-    <p:sldId id="261" r:id="rId7"/>
-    <p:sldId id="262" r:id="rId8"/>
-    <p:sldId id="263" r:id="rId9"/>
-    <p:sldId id="264" r:id="rId10"/>
-    <p:sldId id="265" r:id="rId11"/>
-    <p:sldId id="266" r:id="rId12"/>
-    <p:sldId id="267" r:id="rId13"/>
+    <p:sldId id="269" r:id="rId6"/>
+    <p:sldId id="260" r:id="rId7"/>
+    <p:sldId id="261" r:id="rId8"/>
+    <p:sldId id="262" r:id="rId9"/>
+    <p:sldId id="268" r:id="rId10"/>
+    <p:sldId id="263" r:id="rId11"/>
+    <p:sldId id="264" r:id="rId12"/>
+    <p:sldId id="265" r:id="rId13"/>
+    <p:sldId id="266" r:id="rId14"/>
+    <p:sldId id="267" r:id="rId15"/>
   </p:sldIdLst>
   <p:sldSz cx="9144000" cy="6858000" type="screen4x3"/>
   <p:notesSz cx="6858000" cy="9144000"/>
@@ -299,7 +301,7 @@
           <a:p>
             <a:fld id="{6BFECD78-3C8E-49F2-8FAB-59489D168ABB}" type="datetimeFigureOut">
               <a:rPr lang="en-US" smtClean="0"/>
-              <a:t>15-03-06</a:t>
+              <a:t>15-03-07</a:t>
             </a:fld>
             <a:endParaRPr lang="en-US"/>
           </a:p>
@@ -469,7 +471,7 @@
           <a:p>
             <a:fld id="{6BFECD78-3C8E-49F2-8FAB-59489D168ABB}" type="datetimeFigureOut">
               <a:rPr lang="en-US" smtClean="0"/>
-              <a:t>15-03-06</a:t>
+              <a:t>15-03-07</a:t>
             </a:fld>
             <a:endParaRPr lang="en-US"/>
           </a:p>
@@ -649,7 +651,7 @@
           <a:p>
             <a:fld id="{6BFECD78-3C8E-49F2-8FAB-59489D168ABB}" type="datetimeFigureOut">
               <a:rPr lang="en-US" smtClean="0"/>
-              <a:t>15-03-06</a:t>
+              <a:t>15-03-07</a:t>
             </a:fld>
             <a:endParaRPr lang="en-US"/>
           </a:p>
@@ -819,7 +821,7 @@
           <a:p>
             <a:fld id="{6BFECD78-3C8E-49F2-8FAB-59489D168ABB}" type="datetimeFigureOut">
               <a:rPr lang="en-US" smtClean="0"/>
-              <a:t>15-03-06</a:t>
+              <a:t>15-03-07</a:t>
             </a:fld>
             <a:endParaRPr lang="en-US"/>
           </a:p>
@@ -1065,7 +1067,7 @@
           <a:p>
             <a:fld id="{6BFECD78-3C8E-49F2-8FAB-59489D168ABB}" type="datetimeFigureOut">
               <a:rPr lang="en-US" smtClean="0"/>
-              <a:t>15-03-06</a:t>
+              <a:t>15-03-07</a:t>
             </a:fld>
             <a:endParaRPr lang="en-US"/>
           </a:p>
@@ -1353,7 +1355,7 @@
           <a:p>
             <a:fld id="{6BFECD78-3C8E-49F2-8FAB-59489D168ABB}" type="datetimeFigureOut">
               <a:rPr lang="en-US" smtClean="0"/>
-              <a:t>15-03-06</a:t>
+              <a:t>15-03-07</a:t>
             </a:fld>
             <a:endParaRPr lang="en-US"/>
           </a:p>
@@ -1775,7 +1777,7 @@
           <a:p>
             <a:fld id="{6BFECD78-3C8E-49F2-8FAB-59489D168ABB}" type="datetimeFigureOut">
               <a:rPr lang="en-US" smtClean="0"/>
-              <a:t>15-03-06</a:t>
+              <a:t>15-03-07</a:t>
             </a:fld>
             <a:endParaRPr lang="en-US"/>
           </a:p>
@@ -1893,7 +1895,7 @@
           <a:p>
             <a:fld id="{6BFECD78-3C8E-49F2-8FAB-59489D168ABB}" type="datetimeFigureOut">
               <a:rPr lang="en-US" smtClean="0"/>
-              <a:t>15-03-06</a:t>
+              <a:t>15-03-07</a:t>
             </a:fld>
             <a:endParaRPr lang="en-US"/>
           </a:p>
@@ -1988,7 +1990,7 @@
           <a:p>
             <a:fld id="{6BFECD78-3C8E-49F2-8FAB-59489D168ABB}" type="datetimeFigureOut">
               <a:rPr lang="en-US" smtClean="0"/>
-              <a:t>15-03-06</a:t>
+              <a:t>15-03-07</a:t>
             </a:fld>
             <a:endParaRPr lang="en-US"/>
           </a:p>
@@ -2265,7 +2267,7 @@
           <a:p>
             <a:fld id="{6BFECD78-3C8E-49F2-8FAB-59489D168ABB}" type="datetimeFigureOut">
               <a:rPr lang="en-US" smtClean="0"/>
-              <a:t>15-03-06</a:t>
+              <a:t>15-03-07</a:t>
             </a:fld>
             <a:endParaRPr lang="en-US"/>
           </a:p>
@@ -2522,7 +2524,7 @@
           <a:p>
             <a:fld id="{6BFECD78-3C8E-49F2-8FAB-59489D168ABB}" type="datetimeFigureOut">
               <a:rPr lang="en-US" smtClean="0"/>
-              <a:t>15-03-06</a:t>
+              <a:t>15-03-07</a:t>
             </a:fld>
             <a:endParaRPr lang="en-US"/>
           </a:p>
@@ -2735,7 +2737,7 @@
           <a:p>
             <a:fld id="{6BFECD78-3C8E-49F2-8FAB-59489D168ABB}" type="datetimeFigureOut">
               <a:rPr lang="en-US" smtClean="0"/>
-              <a:t>15-03-06</a:t>
+              <a:t>15-03-07</a:t>
             </a:fld>
             <a:endParaRPr lang="en-US"/>
           </a:p>
@@ -3127,7 +3129,7 @@
           <a:p>
             <a:r>
               <a:rPr lang="en-US" dirty="0" smtClean="0"/>
-              <a:t>Cloth</a:t>
+              <a:t>Cloth: Team Elephant</a:t>
             </a:r>
             <a:endParaRPr lang="en-US" dirty="0"/>
           </a:p>
@@ -3145,10 +3147,62 @@
         </p:nvSpPr>
         <p:spPr/>
         <p:txBody>
-          <a:bodyPr/>
-          <a:lstStyle/>
-          <a:p>
-            <a:endParaRPr lang="en-US"/>
+          <a:bodyPr>
+            <a:normAutofit fontScale="85000" lnSpcReduction="20000"/>
+          </a:bodyPr>
+          <a:lstStyle/>
+          <a:p>
+            <a:r>
+              <a:rPr lang="en-US" dirty="0"/>
+              <a:t>Jeffrey </a:t>
+            </a:r>
+            <a:r>
+              <a:rPr lang="en-US" dirty="0" err="1"/>
+              <a:t>Oduro</a:t>
+            </a:r>
+            <a:endParaRPr lang="en-US" dirty="0"/>
+          </a:p>
+          <a:p>
+            <a:r>
+              <a:rPr lang="en-US" dirty="0" smtClean="0"/>
+              <a:t> </a:t>
+            </a:r>
+            <a:r>
+              <a:rPr lang="en-US" dirty="0" err="1"/>
+              <a:t>Ondra</a:t>
+            </a:r>
+            <a:r>
+              <a:rPr lang="en-US" dirty="0"/>
+              <a:t> Chan</a:t>
+            </a:r>
+          </a:p>
+          <a:p>
+            <a:r>
+              <a:rPr lang="en-US" dirty="0" smtClean="0"/>
+              <a:t> </a:t>
+            </a:r>
+            <a:r>
+              <a:rPr lang="en-US" dirty="0"/>
+              <a:t>Aaron </a:t>
+            </a:r>
+            <a:r>
+              <a:rPr lang="en-US" dirty="0" err="1"/>
+              <a:t>Tse</a:t>
+            </a:r>
+            <a:endParaRPr lang="en-US" dirty="0"/>
+          </a:p>
+          <a:p>
+            <a:r>
+              <a:rPr lang="en-US" dirty="0" smtClean="0"/>
+              <a:t> </a:t>
+            </a:r>
+            <a:r>
+              <a:rPr lang="en-US" dirty="0"/>
+              <a:t>Kevin De Asis</a:t>
+            </a:r>
+          </a:p>
+          <a:p>
+            <a:endParaRPr lang="en-US" dirty="0"/>
           </a:p>
         </p:txBody>
       </p:sp>
@@ -3220,24 +3274,61 @@
         </p:nvSpPr>
         <p:spPr/>
         <p:txBody>
-          <a:bodyPr/>
+          <a:bodyPr>
+            <a:normAutofit fontScale="85000" lnSpcReduction="10000"/>
+          </a:bodyPr>
           <a:lstStyle/>
           <a:p>
             <a:r>
               <a:rPr lang="en-US" dirty="0" smtClean="0"/>
-              <a:t>Edit poly modifier our dress and go to vertices mode.</a:t>
-            </a:r>
-          </a:p>
-          <a:p>
+              <a:t>Create a silhouette of your garment via </a:t>
+            </a:r>
             <a:r>
               <a:rPr lang="en-US" dirty="0" smtClean="0"/>
-              <a:t>What were doing is welding our dress</a:t>
-            </a:r>
+              <a:t>splines or lines</a:t>
+            </a:r>
+            <a:endParaRPr lang="en-US" dirty="0" smtClean="0"/>
           </a:p>
           <a:p>
             <a:r>
               <a:rPr lang="en-US" dirty="0" smtClean="0"/>
-              <a:t>Deselect vertices that </a:t>
+              <a:t>Duplicate your silhouette and attach them</a:t>
+            </a:r>
+          </a:p>
+          <a:p>
+            <a:r>
+              <a:rPr lang="en-US" dirty="0" smtClean="0"/>
+              <a:t>Go to line modifier and use vertices mode</a:t>
+            </a:r>
+          </a:p>
+          <a:p>
+            <a:r>
+              <a:rPr lang="en-US" dirty="0" smtClean="0"/>
+              <a:t>Select vertices and hit break</a:t>
+            </a:r>
+          </a:p>
+          <a:p>
+            <a:r>
+              <a:rPr lang="en-US" dirty="0" smtClean="0"/>
+              <a:t>Now go to garment maker and panel mode</a:t>
+            </a:r>
+          </a:p>
+          <a:p>
+            <a:r>
+              <a:rPr lang="en-US" dirty="0" smtClean="0"/>
+              <a:t>Rotate one of your silhouettes to a complete 180 and put one of them behind your model</a:t>
+            </a:r>
+          </a:p>
+          <a:p>
+            <a:r>
+              <a:rPr lang="en-US" dirty="0" smtClean="0"/>
+              <a:t>Now go to seams modes click your splines on both silhouettes and create seams</a:t>
+            </a:r>
+          </a:p>
+          <a:p>
+            <a:r>
+              <a:rPr lang="en-US" dirty="0" smtClean="0"/>
+              <a:t>If </a:t>
             </a:r>
             <a:r>
               <a:rPr lang="en-US" dirty="0" err="1" smtClean="0"/>
@@ -3249,19 +3340,11 @@
             </a:r>
             <a:r>
               <a:rPr lang="en-US" dirty="0" smtClean="0"/>
-              <a:t>t need to be welded</a:t>
-            </a:r>
-          </a:p>
-          <a:p>
-            <a:r>
-              <a:rPr lang="en-US" dirty="0" smtClean="0"/>
-              <a:t>Then right click and weld</a:t>
-            </a:r>
-          </a:p>
-          <a:p>
-            <a:r>
-              <a:rPr lang="en-US" dirty="0" smtClean="0"/>
-              <a:t>Then change the weld option parameter</a:t>
+              <a:t>t work just increase seam </a:t>
+            </a:r>
+            <a:r>
+              <a:rPr lang="en-US" dirty="0" err="1" smtClean="0"/>
+              <a:t>tollerance</a:t>
             </a:r>
             <a:endParaRPr lang="en-US" dirty="0"/>
           </a:p>
@@ -3270,7 +3353,7 @@
     </p:spTree>
     <p:extLst>
       <p:ext uri="{BB962C8B-B14F-4D97-AF65-F5344CB8AC3E}">
-        <p14:creationId xmlns:p14="http://schemas.microsoft.com/office/powerpoint/2010/main" val="1503978046"/>
+        <p14:creationId xmlns:p14="http://schemas.microsoft.com/office/powerpoint/2010/main" val="314308727"/>
       </p:ext>
     </p:extLst>
   </p:cSld>
@@ -3328,6 +3411,218 @@
         </p:nvSpPr>
         <p:spPr/>
         <p:txBody>
+          <a:bodyPr>
+            <a:normAutofit fontScale="92500"/>
+          </a:bodyPr>
+          <a:lstStyle/>
+          <a:p>
+            <a:r>
+              <a:rPr lang="en-US" dirty="0" smtClean="0"/>
+              <a:t>Now add the cloth modifier</a:t>
+            </a:r>
+          </a:p>
+          <a:p>
+            <a:r>
+              <a:rPr lang="en-US" dirty="0" smtClean="0"/>
+              <a:t>Now add objects for collision in object properties</a:t>
+            </a:r>
+          </a:p>
+          <a:p>
+            <a:r>
+              <a:rPr lang="en-US" dirty="0" smtClean="0"/>
+              <a:t>Now add our dress as cloth in object properties</a:t>
+            </a:r>
+          </a:p>
+          <a:p>
+            <a:r>
+              <a:rPr lang="en-US" dirty="0" smtClean="0"/>
+              <a:t>Use spandex as material as it conforms nicely</a:t>
+            </a:r>
+          </a:p>
+          <a:p>
+            <a:r>
+              <a:rPr lang="en-US" dirty="0" smtClean="0"/>
+              <a:t>Simulate local</a:t>
+            </a:r>
+          </a:p>
+          <a:p>
+            <a:r>
+              <a:rPr lang="en-US" dirty="0" smtClean="0"/>
+              <a:t>Uncheck sewing springs under simulation parameters then click simulate local again</a:t>
+            </a:r>
+            <a:endParaRPr lang="en-US" dirty="0"/>
+          </a:p>
+        </p:txBody>
+      </p:sp>
+    </p:spTree>
+    <p:extLst>
+      <p:ext uri="{BB962C8B-B14F-4D97-AF65-F5344CB8AC3E}">
+        <p14:creationId xmlns:p14="http://schemas.microsoft.com/office/powerpoint/2010/main" val="2377880028"/>
+      </p:ext>
+    </p:extLst>
+  </p:cSld>
+  <p:clrMapOvr>
+    <a:masterClrMapping/>
+  </p:clrMapOvr>
+</p:sld>
+</file>
+
+<file path=ppt/slides/slide12.xml><?xml version="1.0" encoding="utf-8"?>
+<p:sld xmlns:a="http://schemas.openxmlformats.org/drawingml/2006/main" xmlns:r="http://schemas.openxmlformats.org/officeDocument/2006/relationships" xmlns:p="http://schemas.openxmlformats.org/presentationml/2006/main">
+  <p:cSld>
+    <p:spTree>
+      <p:nvGrpSpPr>
+        <p:cNvPr id="1" name=""/>
+        <p:cNvGrpSpPr/>
+        <p:nvPr/>
+      </p:nvGrpSpPr>
+      <p:grpSpPr>
+        <a:xfrm>
+          <a:off x="0" y="0"/>
+          <a:ext cx="0" cy="0"/>
+          <a:chOff x="0" y="0"/>
+          <a:chExt cx="0" cy="0"/>
+        </a:xfrm>
+      </p:grpSpPr>
+      <p:sp>
+        <p:nvSpPr>
+          <p:cNvPr id="2" name="Title 1"/>
+          <p:cNvSpPr>
+            <a:spLocks noGrp="1"/>
+          </p:cNvSpPr>
+          <p:nvPr>
+            <p:ph type="title"/>
+          </p:nvPr>
+        </p:nvSpPr>
+        <p:spPr/>
+        <p:txBody>
+          <a:bodyPr/>
+          <a:lstStyle/>
+          <a:p>
+            <a:endParaRPr lang="en-US"/>
+          </a:p>
+        </p:txBody>
+      </p:sp>
+      <p:sp>
+        <p:nvSpPr>
+          <p:cNvPr id="3" name="Content Placeholder 2"/>
+          <p:cNvSpPr>
+            <a:spLocks noGrp="1"/>
+          </p:cNvSpPr>
+          <p:nvPr>
+            <p:ph idx="1"/>
+          </p:nvPr>
+        </p:nvSpPr>
+        <p:spPr/>
+        <p:txBody>
+          <a:bodyPr/>
+          <a:lstStyle/>
+          <a:p>
+            <a:r>
+              <a:rPr lang="en-US" dirty="0" smtClean="0"/>
+              <a:t>Edit poly modifier our dress and go to vertices mode.</a:t>
+            </a:r>
+          </a:p>
+          <a:p>
+            <a:r>
+              <a:rPr lang="en-US" dirty="0" smtClean="0"/>
+              <a:t>What were doing is welding our dress</a:t>
+            </a:r>
+          </a:p>
+          <a:p>
+            <a:r>
+              <a:rPr lang="en-US" dirty="0" smtClean="0"/>
+              <a:t>Deselect vertices that </a:t>
+            </a:r>
+            <a:r>
+              <a:rPr lang="en-US" dirty="0" err="1" smtClean="0"/>
+              <a:t>doesn</a:t>
+            </a:r>
+            <a:r>
+              <a:rPr lang="fr-FR" dirty="0" smtClean="0"/>
+              <a:t>’</a:t>
+            </a:r>
+            <a:r>
+              <a:rPr lang="en-US" dirty="0" smtClean="0"/>
+              <a:t>t need to be welded</a:t>
+            </a:r>
+          </a:p>
+          <a:p>
+            <a:r>
+              <a:rPr lang="en-US" dirty="0" smtClean="0"/>
+              <a:t>Then right click and weld</a:t>
+            </a:r>
+          </a:p>
+          <a:p>
+            <a:r>
+              <a:rPr lang="en-US" dirty="0" smtClean="0"/>
+              <a:t>Then change the weld option parameter</a:t>
+            </a:r>
+            <a:endParaRPr lang="en-US" dirty="0"/>
+          </a:p>
+        </p:txBody>
+      </p:sp>
+    </p:spTree>
+    <p:extLst>
+      <p:ext uri="{BB962C8B-B14F-4D97-AF65-F5344CB8AC3E}">
+        <p14:creationId xmlns:p14="http://schemas.microsoft.com/office/powerpoint/2010/main" val="1503978046"/>
+      </p:ext>
+    </p:extLst>
+  </p:cSld>
+  <p:clrMapOvr>
+    <a:masterClrMapping/>
+  </p:clrMapOvr>
+</p:sld>
+</file>
+
+<file path=ppt/slides/slide13.xml><?xml version="1.0" encoding="utf-8"?>
+<p:sld xmlns:a="http://schemas.openxmlformats.org/drawingml/2006/main" xmlns:r="http://schemas.openxmlformats.org/officeDocument/2006/relationships" xmlns:p="http://schemas.openxmlformats.org/presentationml/2006/main">
+  <p:cSld>
+    <p:spTree>
+      <p:nvGrpSpPr>
+        <p:cNvPr id="1" name=""/>
+        <p:cNvGrpSpPr/>
+        <p:nvPr/>
+      </p:nvGrpSpPr>
+      <p:grpSpPr>
+        <a:xfrm>
+          <a:off x="0" y="0"/>
+          <a:ext cx="0" cy="0"/>
+          <a:chOff x="0" y="0"/>
+          <a:chExt cx="0" cy="0"/>
+        </a:xfrm>
+      </p:grpSpPr>
+      <p:sp>
+        <p:nvSpPr>
+          <p:cNvPr id="2" name="Title 1"/>
+          <p:cNvSpPr>
+            <a:spLocks noGrp="1"/>
+          </p:cNvSpPr>
+          <p:nvPr>
+            <p:ph type="title"/>
+          </p:nvPr>
+        </p:nvSpPr>
+        <p:spPr/>
+        <p:txBody>
+          <a:bodyPr/>
+          <a:lstStyle/>
+          <a:p>
+            <a:endParaRPr lang="en-US"/>
+          </a:p>
+        </p:txBody>
+      </p:sp>
+      <p:sp>
+        <p:nvSpPr>
+          <p:cNvPr id="3" name="Content Placeholder 2"/>
+          <p:cNvSpPr>
+            <a:spLocks noGrp="1"/>
+          </p:cNvSpPr>
+          <p:nvPr>
+            <p:ph idx="1"/>
+          </p:nvPr>
+        </p:nvSpPr>
+        <p:spPr/>
+        <p:txBody>
           <a:bodyPr/>
           <a:lstStyle/>
           <a:p>
@@ -3380,7 +3675,7 @@
 </p:sld>
 </file>
 
-<file path=ppt/slides/slide12.xml><?xml version="1.0" encoding="utf-8"?>
+<file path=ppt/slides/slide14.xml><?xml version="1.0" encoding="utf-8"?>
 <p:sld xmlns:a="http://schemas.openxmlformats.org/drawingml/2006/main" xmlns:r="http://schemas.openxmlformats.org/officeDocument/2006/relationships" xmlns:p="http://schemas.openxmlformats.org/presentationml/2006/main">
   <p:cSld>
     <p:spTree>
@@ -3503,7 +3798,7 @@
           <a:p>
             <a:r>
               <a:rPr lang="en-US" dirty="0" smtClean="0"/>
-              <a:t>Realism</a:t>
+              <a:t>Realism of Cloth</a:t>
             </a:r>
             <a:endParaRPr lang="en-US" dirty="0"/>
           </a:p>
@@ -3584,6 +3879,10 @@
           <a:bodyPr/>
           <a:lstStyle/>
           <a:p>
+            <a:r>
+              <a:rPr lang="en-US" dirty="0" smtClean="0"/>
+              <a:t>Does anyone see the difference?</a:t>
+            </a:r>
             <a:endParaRPr lang="en-US" dirty="0"/>
           </a:p>
         </p:txBody>
@@ -3663,7 +3962,11 @@
           <a:bodyPr/>
           <a:lstStyle/>
           <a:p>
-            <a:endParaRPr lang="en-US"/>
+            <a:r>
+              <a:rPr lang="en-US" dirty="0" smtClean="0"/>
+              <a:t> </a:t>
+            </a:r>
+            <a:endParaRPr lang="en-US" dirty="0"/>
           </a:p>
         </p:txBody>
       </p:sp>
@@ -3759,11 +4062,13 @@
       </p:sp>
       <p:pic>
         <p:nvPicPr>
-          <p:cNvPr id="5" name="Picture 4" descr="Screenshot 2015-03-06 12.00.28.png"/>
+          <p:cNvPr id="11" name="Content Placeholder 10" descr="Screenshot 2015-03-07 07.12.04.png"/>
           <p:cNvPicPr>
-            <a:picLocks noChangeAspect="1"/>
+            <a:picLocks noGrp="1" noChangeAspect="1"/>
           </p:cNvPicPr>
-          <p:nvPr/>
+          <p:nvPr>
+            <p:ph idx="1"/>
+          </p:nvPr>
         </p:nvPicPr>
         <p:blipFill>
           <a:blip r:embed="rId2">
@@ -3773,39 +4078,13 @@
               </a:ext>
             </a:extLst>
           </a:blip>
+          <a:srcRect t="-26549" b="-26549"/>
           <a:stretch>
             <a:fillRect/>
           </a:stretch>
         </p:blipFill>
-        <p:spPr>
-          <a:xfrm>
-            <a:off x="1643445" y="1251153"/>
-            <a:ext cx="5565305" cy="5494803"/>
-          </a:xfrm>
-          <a:prstGeom prst="rect">
-            <a:avLst/>
-          </a:prstGeom>
-        </p:spPr>
+        <p:spPr/>
       </p:pic>
-      <p:sp>
-        <p:nvSpPr>
-          <p:cNvPr id="6" name="Content Placeholder 5"/>
-          <p:cNvSpPr>
-            <a:spLocks noGrp="1"/>
-          </p:cNvSpPr>
-          <p:nvPr>
-            <p:ph idx="1"/>
-          </p:nvPr>
-        </p:nvSpPr>
-        <p:spPr/>
-        <p:txBody>
-          <a:bodyPr/>
-          <a:lstStyle/>
-          <a:p>
-            <a:endParaRPr lang="en-US" dirty="0"/>
-          </a:p>
-        </p:txBody>
-      </p:sp>
     </p:spTree>
     <p:extLst>
       <p:ext uri="{BB962C8B-B14F-4D97-AF65-F5344CB8AC3E}">
@@ -3860,6 +4139,84 @@
           <a:p>
             <a:r>
               <a:rPr lang="en-US" dirty="0" smtClean="0"/>
+              <a:t>Object Properties</a:t>
+            </a:r>
+            <a:endParaRPr lang="en-US" dirty="0"/>
+          </a:p>
+        </p:txBody>
+      </p:sp>
+      <p:pic>
+        <p:nvPicPr>
+          <p:cNvPr id="4" name="Content Placeholder 3" descr="Screenshot 2015-03-07 07.12.11.png"/>
+          <p:cNvPicPr>
+            <a:picLocks noGrp="1" noChangeAspect="1"/>
+          </p:cNvPicPr>
+          <p:nvPr>
+            <p:ph idx="1"/>
+          </p:nvPr>
+        </p:nvPicPr>
+        <p:blipFill>
+          <a:blip r:embed="rId2">
+            <a:extLst>
+              <a:ext uri="{28A0092B-C50C-407E-A947-70E740481C1C}">
+                <a14:useLocalDpi xmlns:a14="http://schemas.microsoft.com/office/drawing/2010/main" val="0"/>
+              </a:ext>
+            </a:extLst>
+          </a:blip>
+          <a:srcRect t="-23901" b="-23901"/>
+          <a:stretch>
+            <a:fillRect/>
+          </a:stretch>
+        </p:blipFill>
+        <p:spPr/>
+      </p:pic>
+    </p:spTree>
+    <p:extLst>
+      <p:ext uri="{BB962C8B-B14F-4D97-AF65-F5344CB8AC3E}">
+        <p14:creationId xmlns:p14="http://schemas.microsoft.com/office/powerpoint/2010/main" val="3298571610"/>
+      </p:ext>
+    </p:extLst>
+  </p:cSld>
+  <p:clrMapOvr>
+    <a:masterClrMapping/>
+  </p:clrMapOvr>
+</p:sld>
+</file>
+
+<file path=ppt/slides/slide6.xml><?xml version="1.0" encoding="utf-8"?>
+<p:sld xmlns:a="http://schemas.openxmlformats.org/drawingml/2006/main" xmlns:r="http://schemas.openxmlformats.org/officeDocument/2006/relationships" xmlns:p="http://schemas.openxmlformats.org/presentationml/2006/main">
+  <p:cSld>
+    <p:spTree>
+      <p:nvGrpSpPr>
+        <p:cNvPr id="1" name=""/>
+        <p:cNvGrpSpPr/>
+        <p:nvPr/>
+      </p:nvGrpSpPr>
+      <p:grpSpPr>
+        <a:xfrm>
+          <a:off x="0" y="0"/>
+          <a:ext cx="0" cy="0"/>
+          <a:chOff x="0" y="0"/>
+          <a:chExt cx="0" cy="0"/>
+        </a:xfrm>
+      </p:grpSpPr>
+      <p:sp>
+        <p:nvSpPr>
+          <p:cNvPr id="2" name="Title 1"/>
+          <p:cNvSpPr>
+            <a:spLocks noGrp="1"/>
+          </p:cNvSpPr>
+          <p:nvPr>
+            <p:ph type="title"/>
+          </p:nvPr>
+        </p:nvSpPr>
+        <p:spPr/>
+        <p:txBody>
+          <a:bodyPr/>
+          <a:lstStyle/>
+          <a:p>
+            <a:r>
+              <a:rPr lang="en-US" dirty="0" smtClean="0"/>
               <a:t>Simulation</a:t>
             </a:r>
             <a:endParaRPr lang="en-US" dirty="0"/>
@@ -3881,7 +4238,11 @@
           <a:bodyPr/>
           <a:lstStyle/>
           <a:p>
-            <a:endParaRPr lang="en-US"/>
+            <a:r>
+              <a:rPr lang="en-US" dirty="0" smtClean="0"/>
+              <a:t> </a:t>
+            </a:r>
+            <a:endParaRPr lang="en-US" dirty="0"/>
           </a:p>
         </p:txBody>
       </p:sp>
@@ -3935,7 +4296,7 @@
 </p:sld>
 </file>
 
-<file path=ppt/slides/slide6.xml><?xml version="1.0" encoding="utf-8"?>
+<file path=ppt/slides/slide7.xml><?xml version="1.0" encoding="utf-8"?>
 <p:sld xmlns:a="http://schemas.openxmlformats.org/drawingml/2006/main" xmlns:r="http://schemas.openxmlformats.org/officeDocument/2006/relationships" xmlns:p="http://schemas.openxmlformats.org/presentationml/2006/main">
   <p:cSld>
     <p:spTree>
@@ -3969,7 +4330,11 @@
           <a:p>
             <a:r>
               <a:rPr lang="en-US" dirty="0" smtClean="0"/>
-              <a:t>Paper Cuts</a:t>
+              <a:t>Preventing Paper </a:t>
+            </a:r>
+            <a:r>
+              <a:rPr lang="en-US" dirty="0" smtClean="0"/>
+              <a:t>Cuts</a:t>
             </a:r>
             <a:endParaRPr lang="en-US" dirty="0"/>
           </a:p>
@@ -3990,7 +4355,11 @@
           <a:bodyPr/>
           <a:lstStyle/>
           <a:p>
-            <a:endParaRPr lang="en-US"/>
+            <a:r>
+              <a:rPr lang="en-US" dirty="0" smtClean="0"/>
+              <a:t> </a:t>
+            </a:r>
+            <a:endParaRPr lang="en-US" dirty="0"/>
           </a:p>
         </p:txBody>
       </p:sp>
@@ -4044,7 +4413,7 @@
 </p:sld>
 </file>
 
-<file path=ppt/slides/slide7.xml><?xml version="1.0" encoding="utf-8"?>
+<file path=ppt/slides/slide8.xml><?xml version="1.0" encoding="utf-8"?>
 <p:sld xmlns:a="http://schemas.openxmlformats.org/drawingml/2006/main" xmlns:r="http://schemas.openxmlformats.org/officeDocument/2006/relationships" xmlns:p="http://schemas.openxmlformats.org/presentationml/2006/main">
   <p:cSld>
     <p:spTree>
@@ -4101,8 +4470,13 @@
           <a:p>
             <a:r>
               <a:rPr lang="en-US" dirty="0" smtClean="0"/>
-              <a:t>Garment Maker – creates a patch from your splines</a:t>
-            </a:r>
+              <a:t>Garment Maker – creates a patch from your </a:t>
+            </a:r>
+            <a:r>
+              <a:rPr lang="en-US" dirty="0" smtClean="0"/>
+              <a:t>splines or lines</a:t>
+            </a:r>
+            <a:endParaRPr lang="en-US" dirty="0" smtClean="0"/>
           </a:p>
           <a:p>
             <a:r>
@@ -4110,8 +4484,12 @@
               <a:t>Cloth Modifier – simulate your cloth; you can also use </a:t>
             </a:r>
             <a:r>
+              <a:rPr lang="en-US" dirty="0" err="1"/>
+              <a:t>M</a:t>
+            </a:r>
+            <a:r>
               <a:rPr lang="en-US" dirty="0" err="1" smtClean="0"/>
-              <a:t>mcloth</a:t>
+              <a:t>cloth</a:t>
             </a:r>
             <a:endParaRPr lang="en-US" dirty="0"/>
           </a:p>
@@ -4137,138 +4515,6 @@
 </p:sld>
 </file>
 
-<file path=ppt/slides/slide8.xml><?xml version="1.0" encoding="utf-8"?>
-<p:sld xmlns:a="http://schemas.openxmlformats.org/drawingml/2006/main" xmlns:r="http://schemas.openxmlformats.org/officeDocument/2006/relationships" xmlns:p="http://schemas.openxmlformats.org/presentationml/2006/main">
-  <p:cSld>
-    <p:spTree>
-      <p:nvGrpSpPr>
-        <p:cNvPr id="1" name=""/>
-        <p:cNvGrpSpPr/>
-        <p:nvPr/>
-      </p:nvGrpSpPr>
-      <p:grpSpPr>
-        <a:xfrm>
-          <a:off x="0" y="0"/>
-          <a:ext cx="0" cy="0"/>
-          <a:chOff x="0" y="0"/>
-          <a:chExt cx="0" cy="0"/>
-        </a:xfrm>
-      </p:grpSpPr>
-      <p:sp>
-        <p:nvSpPr>
-          <p:cNvPr id="2" name="Title 1"/>
-          <p:cNvSpPr>
-            <a:spLocks noGrp="1"/>
-          </p:cNvSpPr>
-          <p:nvPr>
-            <p:ph type="title"/>
-          </p:nvPr>
-        </p:nvSpPr>
-        <p:spPr/>
-        <p:txBody>
-          <a:bodyPr/>
-          <a:lstStyle/>
-          <a:p>
-            <a:endParaRPr lang="en-US"/>
-          </a:p>
-        </p:txBody>
-      </p:sp>
-      <p:sp>
-        <p:nvSpPr>
-          <p:cNvPr id="3" name="Content Placeholder 2"/>
-          <p:cNvSpPr>
-            <a:spLocks noGrp="1"/>
-          </p:cNvSpPr>
-          <p:nvPr>
-            <p:ph idx="1"/>
-          </p:nvPr>
-        </p:nvSpPr>
-        <p:spPr/>
-        <p:txBody>
-          <a:bodyPr>
-            <a:normAutofit fontScale="92500" lnSpcReduction="20000"/>
-          </a:bodyPr>
-          <a:lstStyle/>
-          <a:p>
-            <a:r>
-              <a:rPr lang="en-US" dirty="0" smtClean="0"/>
-              <a:t>Create a silhouette of your garment via splines</a:t>
-            </a:r>
-          </a:p>
-          <a:p>
-            <a:r>
-              <a:rPr lang="en-US" dirty="0" smtClean="0"/>
-              <a:t>Duplicate your silhouette and attach them</a:t>
-            </a:r>
-          </a:p>
-          <a:p>
-            <a:r>
-              <a:rPr lang="en-US" dirty="0" smtClean="0"/>
-              <a:t>Go to line modifier and use vertices mode</a:t>
-            </a:r>
-          </a:p>
-          <a:p>
-            <a:r>
-              <a:rPr lang="en-US" dirty="0" smtClean="0"/>
-              <a:t>Select vertices and hit break</a:t>
-            </a:r>
-          </a:p>
-          <a:p>
-            <a:r>
-              <a:rPr lang="en-US" dirty="0" smtClean="0"/>
-              <a:t>Now go to garment maker and panel mode</a:t>
-            </a:r>
-          </a:p>
-          <a:p>
-            <a:r>
-              <a:rPr lang="en-US" dirty="0" smtClean="0"/>
-              <a:t>Rotate one of your silhouettes to a complete 180 and put one of them behind your model</a:t>
-            </a:r>
-          </a:p>
-          <a:p>
-            <a:r>
-              <a:rPr lang="en-US" dirty="0" smtClean="0"/>
-              <a:t>Now go to seams modes click your splines on both silhouettes and create seams</a:t>
-            </a:r>
-          </a:p>
-          <a:p>
-            <a:r>
-              <a:rPr lang="en-US" dirty="0" smtClean="0"/>
-              <a:t>If </a:t>
-            </a:r>
-            <a:r>
-              <a:rPr lang="en-US" dirty="0" err="1" smtClean="0"/>
-              <a:t>doesn</a:t>
-            </a:r>
-            <a:r>
-              <a:rPr lang="fr-FR" dirty="0" smtClean="0"/>
-              <a:t>’</a:t>
-            </a:r>
-            <a:r>
-              <a:rPr lang="en-US" dirty="0" smtClean="0"/>
-              <a:t>t work just increase seam </a:t>
-            </a:r>
-            <a:r>
-              <a:rPr lang="en-US" dirty="0" err="1" smtClean="0"/>
-              <a:t>tollerance</a:t>
-            </a:r>
-            <a:endParaRPr lang="en-US" dirty="0"/>
-          </a:p>
-        </p:txBody>
-      </p:sp>
-    </p:spTree>
-    <p:extLst>
-      <p:ext uri="{BB962C8B-B14F-4D97-AF65-F5344CB8AC3E}">
-        <p14:creationId xmlns:p14="http://schemas.microsoft.com/office/powerpoint/2010/main" val="314308727"/>
-      </p:ext>
-    </p:extLst>
-  </p:cSld>
-  <p:clrMapOvr>
-    <a:masterClrMapping/>
-  </p:clrMapOvr>
-</p:sld>
-</file>
-
 <file path=ppt/slides/slide9.xml><?xml version="1.0" encoding="utf-8"?>
 <p:sld xmlns:a="http://schemas.openxmlformats.org/drawingml/2006/main" xmlns:r="http://schemas.openxmlformats.org/officeDocument/2006/relationships" xmlns:p="http://schemas.openxmlformats.org/presentationml/2006/main">
   <p:cSld>
@@ -4305,65 +4551,35 @@
           </a:p>
         </p:txBody>
       </p:sp>
-      <p:sp>
-        <p:nvSpPr>
-          <p:cNvPr id="3" name="Content Placeholder 2"/>
-          <p:cNvSpPr>
-            <a:spLocks noGrp="1"/>
-          </p:cNvSpPr>
+      <p:pic>
+        <p:nvPicPr>
+          <p:cNvPr id="6" name="Content Placeholder 5" descr="Screenshot 2015-03-07 07.00.56.png"/>
+          <p:cNvPicPr>
+            <a:picLocks noGrp="1" noChangeAspect="1"/>
+          </p:cNvPicPr>
           <p:nvPr>
             <p:ph idx="1"/>
           </p:nvPr>
-        </p:nvSpPr>
-        <p:spPr/>
-        <p:txBody>
-          <a:bodyPr>
-            <a:normAutofit fontScale="92500"/>
-          </a:bodyPr>
-          <a:lstStyle/>
-          <a:p>
-            <a:r>
-              <a:rPr lang="en-US" dirty="0" smtClean="0"/>
-              <a:t>Now add the cloth modifier</a:t>
-            </a:r>
-          </a:p>
-          <a:p>
-            <a:r>
-              <a:rPr lang="en-US" dirty="0" smtClean="0"/>
-              <a:t>Now add objects for collision in object properties</a:t>
-            </a:r>
-          </a:p>
-          <a:p>
-            <a:r>
-              <a:rPr lang="en-US" dirty="0" smtClean="0"/>
-              <a:t>Now add our dress as cloth in object properties</a:t>
-            </a:r>
-          </a:p>
-          <a:p>
-            <a:r>
-              <a:rPr lang="en-US" dirty="0" smtClean="0"/>
-              <a:t>Use spandex as material as it conforms nicely</a:t>
-            </a:r>
-          </a:p>
-          <a:p>
-            <a:r>
-              <a:rPr lang="en-US" dirty="0" smtClean="0"/>
-              <a:t>Simulate local</a:t>
-            </a:r>
-          </a:p>
-          <a:p>
-            <a:r>
-              <a:rPr lang="en-US" dirty="0" smtClean="0"/>
-              <a:t>Uncheck sewing springs under simulation parameters then click simulate local again</a:t>
-            </a:r>
-            <a:endParaRPr lang="en-US" dirty="0"/>
-          </a:p>
-        </p:txBody>
-      </p:sp>
+        </p:nvPicPr>
+        <p:blipFill>
+          <a:blip r:embed="rId2">
+            <a:extLst>
+              <a:ext uri="{28A0092B-C50C-407E-A947-70E740481C1C}">
+                <a14:useLocalDpi xmlns:a14="http://schemas.microsoft.com/office/drawing/2010/main" val="0"/>
+              </a:ext>
+            </a:extLst>
+          </a:blip>
+          <a:srcRect l="-24340" r="-24340"/>
+          <a:stretch>
+            <a:fillRect/>
+          </a:stretch>
+        </p:blipFill>
+        <p:spPr/>
+      </p:pic>
     </p:spTree>
     <p:extLst>
       <p:ext uri="{BB962C8B-B14F-4D97-AF65-F5344CB8AC3E}">
-        <p14:creationId xmlns:p14="http://schemas.microsoft.com/office/powerpoint/2010/main" val="2377880028"/>
+        <p14:creationId xmlns:p14="http://schemas.microsoft.com/office/powerpoint/2010/main" val="878684221"/>
       </p:ext>
     </p:extLst>
   </p:cSld>

</xml_diff>

<commit_message>
finished clothing demo for 3ds max.
</commit_message>
<xml_diff>
--- a/Cloth Presentation; not finished.pptx
+++ b/Cloth Presentation; not finished.pptx
@@ -14,11 +14,13 @@
     <p:sldId id="261" r:id="rId8"/>
     <p:sldId id="262" r:id="rId9"/>
     <p:sldId id="268" r:id="rId10"/>
-    <p:sldId id="263" r:id="rId11"/>
-    <p:sldId id="264" r:id="rId12"/>
-    <p:sldId id="265" r:id="rId13"/>
-    <p:sldId id="266" r:id="rId14"/>
-    <p:sldId id="267" r:id="rId15"/>
+    <p:sldId id="270" r:id="rId11"/>
+    <p:sldId id="263" r:id="rId12"/>
+    <p:sldId id="264" r:id="rId13"/>
+    <p:sldId id="265" r:id="rId14"/>
+    <p:sldId id="266" r:id="rId15"/>
+    <p:sldId id="267" r:id="rId16"/>
+    <p:sldId id="271" r:id="rId17"/>
   </p:sldIdLst>
   <p:sldSz cx="9144000" cy="6858000" type="screen4x3"/>
   <p:notesSz cx="6858000" cy="9144000"/>
@@ -3258,7 +3260,7 @@
           <a:bodyPr/>
           <a:lstStyle/>
           <a:p>
-            <a:endParaRPr lang="en-US"/>
+            <a:endParaRPr lang="en-US" dirty="0"/>
           </a:p>
         </p:txBody>
       </p:sp>
@@ -3274,86 +3276,31 @@
         </p:nvSpPr>
         <p:spPr/>
         <p:txBody>
-          <a:bodyPr>
-            <a:normAutofit fontScale="85000" lnSpcReduction="10000"/>
-          </a:bodyPr>
-          <a:lstStyle/>
-          <a:p>
-            <a:r>
-              <a:rPr lang="en-US" dirty="0" smtClean="0"/>
-              <a:t>Create a silhouette of your garment via </a:t>
-            </a:r>
-            <a:r>
-              <a:rPr lang="en-US" dirty="0" smtClean="0"/>
-              <a:t>splines or lines</a:t>
-            </a:r>
-            <a:endParaRPr lang="en-US" dirty="0" smtClean="0"/>
-          </a:p>
-          <a:p>
-            <a:r>
-              <a:rPr lang="en-US" dirty="0" smtClean="0"/>
-              <a:t>Duplicate your silhouette and attach them</a:t>
-            </a:r>
-          </a:p>
-          <a:p>
-            <a:r>
-              <a:rPr lang="en-US" dirty="0" smtClean="0"/>
-              <a:t>Go to line modifier and use vertices mode</a:t>
-            </a:r>
-          </a:p>
-          <a:p>
-            <a:r>
-              <a:rPr lang="en-US" dirty="0" smtClean="0"/>
-              <a:t>Select vertices and hit break</a:t>
-            </a:r>
-          </a:p>
-          <a:p>
-            <a:r>
-              <a:rPr lang="en-US" dirty="0" smtClean="0"/>
-              <a:t>Now go to garment maker and panel mode</a:t>
-            </a:r>
-          </a:p>
-          <a:p>
-            <a:r>
-              <a:rPr lang="en-US" dirty="0" smtClean="0"/>
-              <a:t>Rotate one of your silhouettes to a complete 180 and put one of them behind your model</a:t>
-            </a:r>
-          </a:p>
-          <a:p>
-            <a:r>
-              <a:rPr lang="en-US" dirty="0" smtClean="0"/>
-              <a:t>Now go to seams modes click your splines on both silhouettes and create seams</a:t>
-            </a:r>
-          </a:p>
-          <a:p>
-            <a:r>
-              <a:rPr lang="en-US" dirty="0" smtClean="0"/>
-              <a:t>If </a:t>
-            </a:r>
-            <a:r>
-              <a:rPr lang="en-US" dirty="0" err="1" smtClean="0"/>
-              <a:t>doesn</a:t>
-            </a:r>
-            <a:r>
-              <a:rPr lang="fr-FR" dirty="0" smtClean="0"/>
-              <a:t>’</a:t>
-            </a:r>
-            <a:r>
-              <a:rPr lang="en-US" dirty="0" smtClean="0"/>
-              <a:t>t work just increase seam </a:t>
-            </a:r>
-            <a:r>
-              <a:rPr lang="en-US" dirty="0" err="1" smtClean="0"/>
-              <a:t>tollerance</a:t>
-            </a:r>
-            <a:endParaRPr lang="en-US" dirty="0"/>
+          <a:bodyPr/>
+          <a:lstStyle/>
+          <a:p>
+            <a:pPr marL="0" indent="0">
+              <a:buNone/>
+            </a:pPr>
+            <a:r>
+              <a:rPr lang="en-US" dirty="0"/>
+              <a:t>http://</a:t>
+            </a:r>
+            <a:r>
+              <a:rPr lang="en-US" dirty="0" err="1"/>
+              <a:t>youtu.be</a:t>
+            </a:r>
+            <a:r>
+              <a:rPr lang="en-US" dirty="0"/>
+              <a:t>/xeC1A8T8Lqw</a:t>
+            </a:r>
           </a:p>
         </p:txBody>
       </p:sp>
     </p:spTree>
     <p:extLst>
       <p:ext uri="{BB962C8B-B14F-4D97-AF65-F5344CB8AC3E}">
-        <p14:creationId xmlns:p14="http://schemas.microsoft.com/office/powerpoint/2010/main" val="314308727"/>
+        <p14:creationId xmlns:p14="http://schemas.microsoft.com/office/powerpoint/2010/main" val="1993869743"/>
       </p:ext>
     </p:extLst>
   </p:cSld>
@@ -3412,43 +3359,71 @@
         <p:spPr/>
         <p:txBody>
           <a:bodyPr>
-            <a:normAutofit fontScale="92500"/>
+            <a:normAutofit fontScale="85000" lnSpcReduction="10000"/>
           </a:bodyPr>
           <a:lstStyle/>
           <a:p>
             <a:r>
               <a:rPr lang="en-US" dirty="0" smtClean="0"/>
-              <a:t>Now add the cloth modifier</a:t>
+              <a:t>Create a silhouette of your garment via splines or lines</a:t>
             </a:r>
           </a:p>
           <a:p>
             <a:r>
               <a:rPr lang="en-US" dirty="0" smtClean="0"/>
-              <a:t>Now add objects for collision in object properties</a:t>
+              <a:t>Duplicate your silhouette and attach them</a:t>
             </a:r>
           </a:p>
           <a:p>
             <a:r>
               <a:rPr lang="en-US" dirty="0" smtClean="0"/>
-              <a:t>Now add our dress as cloth in object properties</a:t>
+              <a:t>Go to line modifier and use vertices mode</a:t>
             </a:r>
           </a:p>
           <a:p>
             <a:r>
               <a:rPr lang="en-US" dirty="0" smtClean="0"/>
-              <a:t>Use spandex as material as it conforms nicely</a:t>
+              <a:t>Select vertices and hit break</a:t>
             </a:r>
           </a:p>
           <a:p>
             <a:r>
               <a:rPr lang="en-US" dirty="0" smtClean="0"/>
-              <a:t>Simulate local</a:t>
+              <a:t>Now go to garment maker and panel mode</a:t>
             </a:r>
           </a:p>
           <a:p>
             <a:r>
               <a:rPr lang="en-US" dirty="0" smtClean="0"/>
-              <a:t>Uncheck sewing springs under simulation parameters then click simulate local again</a:t>
+              <a:t>Rotate one of your silhouettes to a complete 180 and put one of them behind your model</a:t>
+            </a:r>
+          </a:p>
+          <a:p>
+            <a:r>
+              <a:rPr lang="en-US" dirty="0" smtClean="0"/>
+              <a:t>Now go to seams modes click your splines on both silhouettes and create seams</a:t>
+            </a:r>
+          </a:p>
+          <a:p>
+            <a:r>
+              <a:rPr lang="en-US" dirty="0" smtClean="0"/>
+              <a:t>If </a:t>
+            </a:r>
+            <a:r>
+              <a:rPr lang="en-US" dirty="0" err="1" smtClean="0"/>
+              <a:t>doesn</a:t>
+            </a:r>
+            <a:r>
+              <a:rPr lang="fr-FR" dirty="0" smtClean="0"/>
+              <a:t>’</a:t>
+            </a:r>
+            <a:r>
+              <a:rPr lang="en-US" dirty="0" smtClean="0"/>
+              <a:t>t work just increase seam </a:t>
+            </a:r>
+            <a:r>
+              <a:rPr lang="en-US" dirty="0" err="1" smtClean="0"/>
+              <a:t>tollerance</a:t>
             </a:r>
             <a:endParaRPr lang="en-US" dirty="0"/>
           </a:p>
@@ -3457,7 +3432,7 @@
     </p:spTree>
     <p:extLst>
       <p:ext uri="{BB962C8B-B14F-4D97-AF65-F5344CB8AC3E}">
-        <p14:creationId xmlns:p14="http://schemas.microsoft.com/office/powerpoint/2010/main" val="2377880028"/>
+        <p14:creationId xmlns:p14="http://schemas.microsoft.com/office/powerpoint/2010/main" val="314308727"/>
       </p:ext>
     </p:extLst>
   </p:cSld>
@@ -3515,48 +3490,44 @@
         </p:nvSpPr>
         <p:spPr/>
         <p:txBody>
-          <a:bodyPr/>
+          <a:bodyPr>
+            <a:normAutofit fontScale="92500"/>
+          </a:bodyPr>
           <a:lstStyle/>
           <a:p>
             <a:r>
               <a:rPr lang="en-US" dirty="0" smtClean="0"/>
-              <a:t>Edit poly modifier our dress and go to vertices mode.</a:t>
+              <a:t>Now add the cloth modifier</a:t>
             </a:r>
           </a:p>
           <a:p>
             <a:r>
               <a:rPr lang="en-US" dirty="0" smtClean="0"/>
-              <a:t>What were doing is welding our dress</a:t>
+              <a:t>Now add objects for collision in object properties</a:t>
             </a:r>
           </a:p>
           <a:p>
             <a:r>
               <a:rPr lang="en-US" dirty="0" smtClean="0"/>
-              <a:t>Deselect vertices that </a:t>
-            </a:r>
-            <a:r>
-              <a:rPr lang="en-US" dirty="0" err="1" smtClean="0"/>
-              <a:t>doesn</a:t>
-            </a:r>
-            <a:r>
-              <a:rPr lang="fr-FR" dirty="0" smtClean="0"/>
-              <a:t>’</a:t>
-            </a:r>
+              <a:t>Now add our dress as cloth in object properties</a:t>
+            </a:r>
+          </a:p>
+          <a:p>
             <a:r>
               <a:rPr lang="en-US" dirty="0" smtClean="0"/>
-              <a:t>t need to be welded</a:t>
+              <a:t>Use spandex as material as it conforms nicely</a:t>
             </a:r>
           </a:p>
           <a:p>
             <a:r>
               <a:rPr lang="en-US" dirty="0" smtClean="0"/>
-              <a:t>Then right click and weld</a:t>
+              <a:t>Simulate local</a:t>
             </a:r>
           </a:p>
           <a:p>
             <a:r>
               <a:rPr lang="en-US" dirty="0" smtClean="0"/>
-              <a:t>Then change the weld option parameter</a:t>
+              <a:t>Uncheck sewing springs under simulation parameters then click simulate local again</a:t>
             </a:r>
             <a:endParaRPr lang="en-US" dirty="0"/>
           </a:p>
@@ -3565,7 +3536,7 @@
     </p:spTree>
     <p:extLst>
       <p:ext uri="{BB962C8B-B14F-4D97-AF65-F5344CB8AC3E}">
-        <p14:creationId xmlns:p14="http://schemas.microsoft.com/office/powerpoint/2010/main" val="1503978046"/>
+        <p14:creationId xmlns:p14="http://schemas.microsoft.com/office/powerpoint/2010/main" val="2377880028"/>
       </p:ext>
     </p:extLst>
   </p:cSld>
@@ -3628,35 +3599,43 @@
           <a:p>
             <a:r>
               <a:rPr lang="en-US" dirty="0" smtClean="0"/>
-              <a:t>Now for the collision mesh add </a:t>
+              <a:t>Edit poly modifier our dress and go to vertices mode.</a:t>
+            </a:r>
+          </a:p>
+          <a:p>
+            <a:r>
+              <a:rPr lang="en-US" dirty="0" smtClean="0"/>
+              <a:t>What were doing is welding our dress</a:t>
+            </a:r>
+          </a:p>
+          <a:p>
+            <a:r>
+              <a:rPr lang="en-US" dirty="0" smtClean="0"/>
+              <a:t>Deselect vertices that </a:t>
             </a:r>
             <a:r>
               <a:rPr lang="en-US" dirty="0" err="1" smtClean="0"/>
-              <a:t>MassFx</a:t>
+              <a:t>doesn</a:t>
+            </a:r>
+            <a:r>
+              <a:rPr lang="fr-FR" dirty="0" smtClean="0"/>
+              <a:t>’</a:t>
             </a:r>
             <a:r>
               <a:rPr lang="en-US" dirty="0" smtClean="0"/>
-              <a:t> </a:t>
-            </a:r>
-            <a:r>
-              <a:rPr lang="en-US" dirty="0" err="1" smtClean="0"/>
-              <a:t>RigidBody</a:t>
-            </a:r>
+              <a:t>t need to be welded</a:t>
+            </a:r>
+          </a:p>
+          <a:p>
             <a:r>
               <a:rPr lang="en-US" dirty="0" smtClean="0"/>
-              <a:t> Modifier</a:t>
+              <a:t>Then right click and weld</a:t>
             </a:r>
           </a:p>
           <a:p>
             <a:r>
               <a:rPr lang="en-US" dirty="0" smtClean="0"/>
-              <a:t>We now have a geometry added for bounding box</a:t>
-            </a:r>
-          </a:p>
-          <a:p>
-            <a:r>
-              <a:rPr lang="en-US" dirty="0" smtClean="0"/>
-              <a:t>Set rigid body property as static and physical shape type as original</a:t>
+              <a:t>Then change the weld option parameter</a:t>
             </a:r>
             <a:endParaRPr lang="en-US" dirty="0"/>
           </a:p>
@@ -3665,7 +3644,7 @@
     </p:spTree>
     <p:extLst>
       <p:ext uri="{BB962C8B-B14F-4D97-AF65-F5344CB8AC3E}">
-        <p14:creationId xmlns:p14="http://schemas.microsoft.com/office/powerpoint/2010/main" val="2578473847"/>
+        <p14:creationId xmlns:p14="http://schemas.microsoft.com/office/powerpoint/2010/main" val="1503978046"/>
       </p:ext>
     </p:extLst>
   </p:cSld>
@@ -3728,6 +3707,106 @@
           <a:p>
             <a:r>
               <a:rPr lang="en-US" dirty="0" smtClean="0"/>
+              <a:t>Now for the collision mesh add </a:t>
+            </a:r>
+            <a:r>
+              <a:rPr lang="en-US" dirty="0" err="1" smtClean="0"/>
+              <a:t>MassFx</a:t>
+            </a:r>
+            <a:r>
+              <a:rPr lang="en-US" dirty="0" smtClean="0"/>
+              <a:t> </a:t>
+            </a:r>
+            <a:r>
+              <a:rPr lang="en-US" dirty="0" err="1" smtClean="0"/>
+              <a:t>RigidBody</a:t>
+            </a:r>
+            <a:r>
+              <a:rPr lang="en-US" dirty="0" smtClean="0"/>
+              <a:t> Modifier</a:t>
+            </a:r>
+          </a:p>
+          <a:p>
+            <a:r>
+              <a:rPr lang="en-US" dirty="0" smtClean="0"/>
+              <a:t>We now have a geometry added for bounding box</a:t>
+            </a:r>
+          </a:p>
+          <a:p>
+            <a:r>
+              <a:rPr lang="en-US" dirty="0" smtClean="0"/>
+              <a:t>Set rigid body property as static and physical shape type as original</a:t>
+            </a:r>
+            <a:endParaRPr lang="en-US" dirty="0"/>
+          </a:p>
+        </p:txBody>
+      </p:sp>
+    </p:spTree>
+    <p:extLst>
+      <p:ext uri="{BB962C8B-B14F-4D97-AF65-F5344CB8AC3E}">
+        <p14:creationId xmlns:p14="http://schemas.microsoft.com/office/powerpoint/2010/main" val="2578473847"/>
+      </p:ext>
+    </p:extLst>
+  </p:cSld>
+  <p:clrMapOvr>
+    <a:masterClrMapping/>
+  </p:clrMapOvr>
+</p:sld>
+</file>
+
+<file path=ppt/slides/slide15.xml><?xml version="1.0" encoding="utf-8"?>
+<p:sld xmlns:a="http://schemas.openxmlformats.org/drawingml/2006/main" xmlns:r="http://schemas.openxmlformats.org/officeDocument/2006/relationships" xmlns:p="http://schemas.openxmlformats.org/presentationml/2006/main">
+  <p:cSld>
+    <p:spTree>
+      <p:nvGrpSpPr>
+        <p:cNvPr id="1" name=""/>
+        <p:cNvGrpSpPr/>
+        <p:nvPr/>
+      </p:nvGrpSpPr>
+      <p:grpSpPr>
+        <a:xfrm>
+          <a:off x="0" y="0"/>
+          <a:ext cx="0" cy="0"/>
+          <a:chOff x="0" y="0"/>
+          <a:chExt cx="0" cy="0"/>
+        </a:xfrm>
+      </p:grpSpPr>
+      <p:sp>
+        <p:nvSpPr>
+          <p:cNvPr id="2" name="Title 1"/>
+          <p:cNvSpPr>
+            <a:spLocks noGrp="1"/>
+          </p:cNvSpPr>
+          <p:nvPr>
+            <p:ph type="title"/>
+          </p:nvPr>
+        </p:nvSpPr>
+        <p:spPr/>
+        <p:txBody>
+          <a:bodyPr/>
+          <a:lstStyle/>
+          <a:p>
+            <a:endParaRPr lang="en-US"/>
+          </a:p>
+        </p:txBody>
+      </p:sp>
+      <p:sp>
+        <p:nvSpPr>
+          <p:cNvPr id="3" name="Content Placeholder 2"/>
+          <p:cNvSpPr>
+            <a:spLocks noGrp="1"/>
+          </p:cNvSpPr>
+          <p:nvPr>
+            <p:ph idx="1"/>
+          </p:nvPr>
+        </p:nvSpPr>
+        <p:spPr/>
+        <p:txBody>
+          <a:bodyPr/>
+          <a:lstStyle/>
+          <a:p>
+            <a:r>
+              <a:rPr lang="en-US" dirty="0" smtClean="0"/>
               <a:t>Back to our cloth we need it to be dynamic for our </a:t>
             </a:r>
             <a:r>
@@ -3755,6 +3834,130 @@
     <p:extLst>
       <p:ext uri="{BB962C8B-B14F-4D97-AF65-F5344CB8AC3E}">
         <p14:creationId xmlns:p14="http://schemas.microsoft.com/office/powerpoint/2010/main" val="3498334374"/>
+      </p:ext>
+    </p:extLst>
+  </p:cSld>
+  <p:clrMapOvr>
+    <a:masterClrMapping/>
+  </p:clrMapOvr>
+</p:sld>
+</file>
+
+<file path=ppt/slides/slide16.xml><?xml version="1.0" encoding="utf-8"?>
+<p:sld xmlns:a="http://schemas.openxmlformats.org/drawingml/2006/main" xmlns:r="http://schemas.openxmlformats.org/officeDocument/2006/relationships" xmlns:p="http://schemas.openxmlformats.org/presentationml/2006/main">
+  <p:cSld>
+    <p:spTree>
+      <p:nvGrpSpPr>
+        <p:cNvPr id="1" name=""/>
+        <p:cNvGrpSpPr/>
+        <p:nvPr/>
+      </p:nvGrpSpPr>
+      <p:grpSpPr>
+        <a:xfrm>
+          <a:off x="0" y="0"/>
+          <a:ext cx="0" cy="0"/>
+          <a:chOff x="0" y="0"/>
+          <a:chExt cx="0" cy="0"/>
+        </a:xfrm>
+      </p:grpSpPr>
+      <p:sp>
+        <p:nvSpPr>
+          <p:cNvPr id="2" name="Title 1"/>
+          <p:cNvSpPr>
+            <a:spLocks noGrp="1"/>
+          </p:cNvSpPr>
+          <p:nvPr>
+            <p:ph type="title"/>
+          </p:nvPr>
+        </p:nvSpPr>
+        <p:spPr/>
+        <p:txBody>
+          <a:bodyPr/>
+          <a:lstStyle/>
+          <a:p>
+            <a:r>
+              <a:rPr lang="en-US" dirty="0" smtClean="0"/>
+              <a:t>Reference</a:t>
+            </a:r>
+            <a:endParaRPr lang="en-US" dirty="0"/>
+          </a:p>
+        </p:txBody>
+      </p:sp>
+      <p:sp>
+        <p:nvSpPr>
+          <p:cNvPr id="3" name="Content Placeholder 2"/>
+          <p:cNvSpPr>
+            <a:spLocks noGrp="1"/>
+          </p:cNvSpPr>
+          <p:nvPr>
+            <p:ph idx="1"/>
+          </p:nvPr>
+        </p:nvSpPr>
+        <p:spPr/>
+        <p:txBody>
+          <a:bodyPr/>
+          <a:lstStyle/>
+          <a:p>
+            <a:r>
+              <a:rPr lang="en-US" dirty="0"/>
+              <a:t>https://</a:t>
+            </a:r>
+            <a:r>
+              <a:rPr lang="en-US" dirty="0" err="1"/>
+              <a:t>www.youtube.com</a:t>
+            </a:r>
+            <a:r>
+              <a:rPr lang="en-US" dirty="0"/>
+              <a:t>/</a:t>
+            </a:r>
+            <a:r>
+              <a:rPr lang="en-US" dirty="0" err="1"/>
+              <a:t>watch?v</a:t>
+            </a:r>
+            <a:r>
+              <a:rPr lang="en-US" dirty="0"/>
+              <a:t>=</a:t>
+            </a:r>
+            <a:r>
+              <a:rPr lang="en-US" dirty="0" err="1"/>
+              <a:t>MEsRmPgmt</a:t>
+            </a:r>
+            <a:r>
+              <a:rPr lang="en-US" dirty="0"/>
+              <a:t>-I</a:t>
+            </a:r>
+          </a:p>
+          <a:p>
+            <a:endParaRPr lang="en-US" dirty="0"/>
+          </a:p>
+          <a:p>
+            <a:r>
+              <a:rPr lang="en-US" dirty="0"/>
+              <a:t>https://</a:t>
+            </a:r>
+            <a:r>
+              <a:rPr lang="en-US" dirty="0" err="1"/>
+              <a:t>www.youtube.com</a:t>
+            </a:r>
+            <a:r>
+              <a:rPr lang="en-US" dirty="0"/>
+              <a:t>/</a:t>
+            </a:r>
+            <a:r>
+              <a:rPr lang="en-US" dirty="0" err="1"/>
+              <a:t>watch?v</a:t>
+            </a:r>
+            <a:r>
+              <a:rPr lang="en-US" dirty="0"/>
+              <a:t>=7ccxNRmakY4</a:t>
+            </a:r>
+          </a:p>
+        </p:txBody>
+      </p:sp>
+    </p:spTree>
+    <p:extLst>
+      <p:ext uri="{BB962C8B-B14F-4D97-AF65-F5344CB8AC3E}">
+        <p14:creationId xmlns:p14="http://schemas.microsoft.com/office/powerpoint/2010/main" val="42334391"/>
       </p:ext>
     </p:extLst>
   </p:cSld>
@@ -4330,11 +4533,7 @@
           <a:p>
             <a:r>
               <a:rPr lang="en-US" dirty="0" smtClean="0"/>
-              <a:t>Preventing Paper </a:t>
-            </a:r>
-            <a:r>
-              <a:rPr lang="en-US" dirty="0" smtClean="0"/>
-              <a:t>Cuts</a:t>
+              <a:t>Preventing Paper Cuts</a:t>
             </a:r>
             <a:endParaRPr lang="en-US" dirty="0"/>
           </a:p>
@@ -4470,13 +4669,8 @@
           <a:p>
             <a:r>
               <a:rPr lang="en-US" dirty="0" smtClean="0"/>
-              <a:t>Garment Maker – creates a patch from your </a:t>
-            </a:r>
-            <a:r>
-              <a:rPr lang="en-US" dirty="0" smtClean="0"/>
-              <a:t>splines or lines</a:t>
-            </a:r>
-            <a:endParaRPr lang="en-US" dirty="0" smtClean="0"/>
+              <a:t>Garment Maker – creates a patch from your splines or lines</a:t>
+            </a:r>
           </a:p>
           <a:p>
             <a:r>

</xml_diff>